<commit_message>
Evaluation Model, Training of ResNet and Vision Transformer with little data augmentation
</commit_message>
<xml_diff>
--- a/Präsentation1.pptx
+++ b/Präsentation1.pptx
@@ -8,6 +8,15 @@
     <p:sldId id="256" r:id="rId2"/>
     <p:sldId id="257" r:id="rId3"/>
     <p:sldId id="258" r:id="rId4"/>
+    <p:sldId id="262" r:id="rId5"/>
+    <p:sldId id="264" r:id="rId6"/>
+    <p:sldId id="263" r:id="rId7"/>
+    <p:sldId id="261" r:id="rId8"/>
+    <p:sldId id="265" r:id="rId9"/>
+    <p:sldId id="267" r:id="rId10"/>
+    <p:sldId id="266" r:id="rId11"/>
+    <p:sldId id="268" r:id="rId12"/>
+    <p:sldId id="269" r:id="rId13"/>
   </p:sldIdLst>
   <p:sldSz cx="12192000" cy="6858000"/>
   <p:notesSz cx="6858000" cy="9144000"/>
@@ -106,6 +115,11 @@
       </a:defRPr>
     </a:lvl9pPr>
   </p:defaultTextStyle>
+  <p:extLst>
+    <p:ext uri="{EFAFB233-063F-42B5-8137-9DF3F51BA10A}">
+      <p15:sldGuideLst xmlns:p15="http://schemas.microsoft.com/office/powerpoint/2012/main"/>
+    </p:ext>
+  </p:extLst>
 </p:presentation>
 </file>
 
@@ -3386,6 +3400,597 @@
 </p:sld>
 </file>
 
+<file path=ppt/slides/slide10.xml><?xml version="1.0" encoding="utf-8"?>
+<p:sld xmlns:a="http://schemas.openxmlformats.org/drawingml/2006/main" xmlns:r="http://schemas.openxmlformats.org/officeDocument/2006/relationships" xmlns:p="http://schemas.openxmlformats.org/presentationml/2006/main">
+  <p:cSld>
+    <p:spTree>
+      <p:nvGrpSpPr>
+        <p:cNvPr id="1" name=""/>
+        <p:cNvGrpSpPr/>
+        <p:nvPr/>
+      </p:nvGrpSpPr>
+      <p:grpSpPr>
+        <a:xfrm>
+          <a:off x="0" y="0"/>
+          <a:ext cx="0" cy="0"/>
+          <a:chOff x="0" y="0"/>
+          <a:chExt cx="0" cy="0"/>
+        </a:xfrm>
+      </p:grpSpPr>
+      <p:sp>
+        <p:nvSpPr>
+          <p:cNvPr id="2" name="Titel 1">
+            <a:extLst>
+              <a:ext uri="{FF2B5EF4-FFF2-40B4-BE49-F238E27FC236}">
+                <a16:creationId xmlns:a16="http://schemas.microsoft.com/office/drawing/2014/main" id="{1F20CAF2-C127-4F0A-B316-19CC56055294}"/>
+              </a:ext>
+            </a:extLst>
+          </p:cNvPr>
+          <p:cNvSpPr>
+            <a:spLocks noGrp="1"/>
+          </p:cNvSpPr>
+          <p:nvPr>
+            <p:ph type="title"/>
+          </p:nvPr>
+        </p:nvSpPr>
+        <p:spPr/>
+        <p:txBody>
+          <a:bodyPr/>
+          <a:lstStyle/>
+          <a:p>
+            <a:r>
+              <a:rPr lang="de-DE" dirty="0"/>
+              <a:t>ResNet50 (no.1) – Labels</a:t>
+            </a:r>
+          </a:p>
+        </p:txBody>
+      </p:sp>
+      <p:sp>
+        <p:nvSpPr>
+          <p:cNvPr id="4" name="Textfeld 3">
+            <a:extLst>
+              <a:ext uri="{FF2B5EF4-FFF2-40B4-BE49-F238E27FC236}">
+                <a16:creationId xmlns:a16="http://schemas.microsoft.com/office/drawing/2014/main" id="{A8C06F69-4BBE-4E8B-9564-6E5737B41EB9}"/>
+              </a:ext>
+            </a:extLst>
+          </p:cNvPr>
+          <p:cNvSpPr txBox="1"/>
+          <p:nvPr/>
+        </p:nvSpPr>
+        <p:spPr>
+          <a:xfrm>
+            <a:off x="326572" y="1517032"/>
+            <a:ext cx="11703131" cy="1938992"/>
+          </a:xfrm>
+          <a:prstGeom prst="rect">
+            <a:avLst/>
+          </a:prstGeom>
+          <a:noFill/>
+        </p:spPr>
+        <p:txBody>
+          <a:bodyPr wrap="square">
+            <a:spAutoFit/>
+          </a:bodyPr>
+          <a:lstStyle/>
+          <a:p>
+            <a:r>
+              <a:rPr lang="de-DE" sz="600" b="1" u="sng" dirty="0"/>
+              <a:t>Labels Testdaten: </a:t>
+            </a:r>
+          </a:p>
+          <a:p>
+            <a:r>
+              <a:rPr lang="de-DE" sz="600" dirty="0"/>
+              <a:t>[1, 7, 16, 21, 3, 22, 0, 25, 17, 19, 8, 4, 25, 2, 0, 16, 10, 9, 20, 21, 24, 18, 16, 15, 23, 8, 13, 1, 19, 3, 4, 10, 3, 17, 9, 8, 25, 24, 0, 20, 18, 21, 14, 3, 14, 16, 12, 9, 0, 2, 20, 14, 4, 25, 12, 13, 22, 0, 7, 11, 13, 22, 12, 19, 6, 18, 22, 5, 11, 14, 23, 3, 14, 22, 1, 25, 10, 12, 9, 24, 22, 3, 8, 25, 21, 11, 13, 5, 3, 23, 14, 6, 7, 21, 15, 4, 13, 10, 25, 20, 19, 19, 16, 1, 2, 11, 5, 5, 24, 25, 15, 20, 18, 20, 9, 6, 5, 20, 21, 7, 6, 7, 0, 17, 12, 11, 15, 2, 18, 6, </a:t>
+            </a:r>
+          </a:p>
+          <a:p>
+            <a:r>
+              <a:rPr lang="de-DE" sz="600" dirty="0"/>
+              <a:t>6, 22, 9, 24, 25, 9, 15, 13, 16, 4, 10, 7, 17, 11, 4, 16, 23, 18, 5, 14, 24, 7, 10, 11, 20, 1, 19, 19, 8, 10, 8, 20, 5, 19, 10, 18, 18, 15, 5, 8, 10, 15, 8, 2, 11, 8, 9, 18, 10, 3, 6, 3, 24, 2, 12, 22, 15, 11, 15, 2, 21, 0, 25, 18, 16, 1, 19, 11, 12, 7, 24, 16, 1, 17, 11, 6, 4, 2, 20, 20, 13, 6, 4, 4, 2, 3, 13, 20, 19, 25, 15, 5, 8, 11, 8, 18, 18, 1, 12, 2, 15, 0, 10, 11, 1, 13, 13, 13, 18, 2, 4, 22, 15, 17, 16, 24, 17, 12, 18, 24, 9, 1, 9, 14, 25, 25, 15, 19, 5, 25, 21, 4, 13, 22, 16, 1, 0, 13, 7, 0, 5, 25, 18, 2, 23, 7, 25, 21, 6, 3, 21, 3, 3, 0, 6, 10, 24, 16, 18, 17, 14, 20, 14, 0, 1, 9, 23, 21, 22, 17, 25, 14, 16, 25, 10, 10, 3, 23, 4, 18, 19, 24, 4, 7, 20, 12, 4, 9, 6, 10, 22, 23, 17, 5, 24, 8, 15, 6, 21, 15, 21, 19, 23, 5, 15, 23, 23, 12, 6, 1, 20, 14, 22, 3, 16, 8, 25, 23, 7, 9, 3, 16, 7, 1, 10, 2, 8, 12, 18, 4, 9, 22, 6, 2, 5, 14, 10, 12, 17, 7, 4, 22, 14, 13, 18, 12, 4, 2, 11, 10, 7, 21, 15, 22, 8, 25, 6, 16, 23, 20, 24, 7, 3, 1, 1, 10, 19, 19, 23, 11, 17, 21, 14, 13, 1, 17, 22, 2, 7, 22, 17, 20, 20, 5, 0, 15, 12, 24, 12, 2, 17, 20, 14, 20, 4, 19, 3, 17, 22, 8, 1, 7, 5, 17, 14, 21, 6, 8, 11, 0, 2, 21, 10, 12, 10, 13, 5, 18, 24, 22, 9, 0, 21, 3, 10, 17, 12, 20, 13, 7, 17, 16, 9, 17, 20, 6, 21, 7, </a:t>
+            </a:r>
+          </a:p>
+          <a:p>
+            <a:r>
+              <a:rPr lang="de-DE" sz="600" dirty="0"/>
+              <a:t>11, 18, 17, 18, 14, 19, 24, 3, 19, 23, 4, 5, 5, 10, 24, 23, 5, 6, 22, 14, 9, 19, 10, 23, 8, 19, 25, 18, 17, 18, 6, 22, 21, 9, 21, 6, 1, 1, 23, 8, 0, 14, 23, 23, 21, 25, 24, 8, 16, 17, 12, 11, 5, 16, 11, 22, 12, 7, 3, 0, 25, 1, 10, 8, 11, 24, 19, 20, 7, 3, 19, 0, 17, 9, 15, 22, 0, 9, 3, 16, 17, 4, 0, 15, 5, 0, 13, 18, 9, 1, 5, 5, 16, 4, 16, 18, 9, 24, 17, 13, 0, 22, 1, 10, 21, 25, 0, 16, 6, 25, 4, 19, 22, 3, 17, 10, 18, 8, 24, 8, 1, 13, 21, 23, 9, 8, 4, 6, 1, 7, 5, 19, 20, 11, 6, 8, 7, </a:t>
+            </a:r>
+          </a:p>
+          <a:p>
+            <a:r>
+              <a:rPr lang="de-DE" sz="600" dirty="0"/>
+              <a:t>4, 14, 12, 24, 6, 1, 2, 14, 0, 25, 19, 12, 15, 20, 9, 23, 22, 15, 0, 9, 2, 0, 15, 15, 24, 15, 1, 15, 11, 14, 13, 19, 12, 22, 14, 12, 16, 18, 7, 20, 17, 3, 0, 9, 14, 3, 14, 15, 7, 1, 14, 12, 13, 23, 5, 11, 21, 8, 24, 2, 13, 21, 2, 2, 16, 22, 25, </a:t>
+            </a:r>
+          </a:p>
+          <a:p>
+            <a:r>
+              <a:rPr lang="de-DE" sz="600" dirty="0"/>
+              <a:t>14, 20, 3, 17, 18, 10, 11, 18, 17, 9, 2, 6, 13, 21, 24, 16, 4, 4, 4, 11, 12, 14, 16, 11, 15, 13, 13, 24, 13, 19, 4, 24, 8, 11, 19, 21, 23, 23, 3, 1, 7, 5, 7, 3, 23, 4, 11, 9, 10, 6, 8, 1, 23, 16, 5, 0, 21, 23, 8, 2, 9, 13, 2, 7, 2, 25, 25, 2, 19, 15, 5, 9, 12, 6, 11, 11, 0, 12, 13, 14, 15, 6, 20, 16, 22, 2, 8, 10, 24, 3, 24, 7, 23, 5, 13, 12, 12, 21, 25, 16, 20, 2, 0, 6, 23, 19, 4, 20]</a:t>
+            </a:r>
+          </a:p>
+          <a:p>
+            <a:endParaRPr lang="de-DE" sz="600" b="1" u="sng" dirty="0"/>
+          </a:p>
+          <a:p>
+            <a:r>
+              <a:rPr lang="de-DE" sz="600" b="1" u="sng" dirty="0"/>
+              <a:t>vorhergesagte Testdaten:</a:t>
+            </a:r>
+          </a:p>
+          <a:p>
+            <a:r>
+              <a:rPr lang="de-DE" sz="600" dirty="0"/>
+              <a:t> [1, 7, 15, 21, 3, 22, 4, 25, 17, 19, 8, 4, 8, 2, 0, 16, 10, 6, 20, 21, 24, 24, 16, 15, 23, 1, 13, 1, 19, 3, 4, 10, 3, 17, 6, 21, 23, 24, 0, 20, 4, 21, 14, 3, 14, 16, 12, 9, 0, 2, 20, 14, 4, 25, 12, 13, 22, 0, 2, 11, 13, </a:t>
+            </a:r>
+          </a:p>
+          <a:p>
+            <a:r>
+              <a:rPr lang="de-DE" sz="600" dirty="0"/>
+              <a:t>22, 12, 19, 7, 4, 22, 21, 11, 14, 4, 3, 14, 22, 1, 20, 10, 12, 9, 24, 22, 3, 21, 25, 21, 11, 13, 5, 8, 23, 14, 2, 7, 22, 15, 4, 13, 10, 2, 17, 19, 19, 16, 1, 2, 11, 5, 5, 11, 25, 15, 20, 23, 20, 16, 2, 5, 20, 21, 7, 6, 7, 0, 11, 12, 11, 15, 2, 4, 6, 7, 21, 25, 24, 21, 6, 15, 4, 16, 4, 10, 7, 17, 11, 4, 16, 18, 12, 5, 14, 24, 7, 10, 11, 17, 10, 19, 0, 6, 10, 8, 20, 22, 19, 10, 18, 18, 15, 5, 8, 10, 15, 25, 2, 11, 8, 9, 0, 10, 3, 6, 3, 24, 2, 12, 22, 15, 24, 15, 2, 21, 12, 25, 2, 16, 1, </a:t>
+            </a:r>
+          </a:p>
+          <a:p>
+            <a:r>
+              <a:rPr lang="de-DE" sz="600" dirty="0"/>
+              <a:t>19, 11, 12, 7, 24, 16, 1, 17, 11, 6, 4, 2, 21, 17, 12, 6, 4, 0, 3, 3, 13, 21, 19, 25, 15, 5, 8, 11, 8, 12, 18, 1, 12, 2, 6, 0, 10, 11, 1, 13, 13, 13, 18, 2, 4, 22, 15, 17, 16, 24, 17, 12, 18, 0, 9, 10, 9, 14, 25, 25, 15, 19, 5, 25, 21, 4, 13, 22, 16, 1, 19, 13, 7, 0, 5, 25, 12, 2, 23, 7, 25, 21, 6, 3, 23, 3, 3, 22, 6, 21, 24, 16, 18, 20, 14, 10, 14, 0, 1, 9, 23, 21, 21, 17, 25, 14, 16, 25, 10, 10, 3, 23, 4, 18, 13, 19, 4, 7, 17, 13, 4, 9, 6, 10, 22, 17, 17, 5, 24, 8, 15, 2, 21, 15, 21, 19, 6, 5, 15, 23, 23, 12, 6, 1, 20, 14, 22, 3, 16, 1, 25, 23, 7, 9, 3, 15, 7, 1, 10, 2, 0, 18, 14, 4, 9, 22, 1, 2, 5, 14, 21, 3, 17, 7, 25, 22, 14, 13, 18, 4, 4, 2, 11, 21, 1, 21, 15, 21, 1, 25, 6, 16, 23, 1, 24, 10, 1, 1, 1, 10, 19, 19, 23, 24, 23, 21, 14, 13, 1, 17, 22, 2, 23, 21, 17, 20, 20, 5, 0, 15, 18, 24, 12, 2, 3, 20, 14, 20, 4, 24, 3, 21, 22, 8, 1, 7, 5, 17, 14, 21, 6, 8, 11, 0, 2, 21, 21, 13, 10, 4, 22, 0, 24, 21, 9, 0, 23, 25, 10, 17, 12, 20, 12, 7, 17, 16, 9, 17, 20, 6, 21, 7, 3, 23, 3, 18, 14, 19, 24, 3, 19, 23, 0, 5, 5, 21, 24, 23, 5, 6, 22, 14, 8, 19, 25, 23, 8, 19, 4, 0, 17, 18, 16, 21, 21, 9, 21, 6, 1, 1, 23, 4, 21, 14, 8, 8, 21, 23, 24, 8, 16, 17, 12, 11, 5, 16, 11, 22, 12, 7, 3, 0, 25, 1, 10, 8, 11, 24, 23, 24, 21, 3, 24, 0, 17, 9, 15, 22, 0, 6, 3, 16, 18, 4, 0, 15, 5, 18, 13, 21, 9, 1, 5, 5, 16, 4, 16, 18, 9, 10, 17, 13, 0, 21, 1, 21, 22, 12, 18, 16, 6, 25, 4, 19, 22, 3, 17, 19, 4, 5, 24, 8, 1, 13, 22, 13, 9, 8, 4, 21, 1, 2, 3, 19, 20, 11, 6, 8, 7, 1, 14, 12, 24, 6, 1, 3, 14, 0, 25, 21, 12, 15, 14, 9, 23, 21, 15, 0, 9, 2, 0, 15, 19, 24, 15, 1, 15, 11, 2, 13, 24, 12, 21, 14, 12, 16, 18, 7, 20, 17, 3, 0, 9, 14, 5, 14, 15, 7, 1, 14, 12, 13, 17, 5, 11, 10, 8, 5, 2, 13, 21, 2, 2, 16, 22, 25, 14, 24, 3, 17, 18, 10, 11, 18, 17, 9, 2, 6, 13, 21, 24, 16, 9, 1, 4, 11, 12, 14, 16, 11, 15, 13, 13, 24, 13, 19, 4, 24, 5, 11, 19, 21, 23, 23, 3, 1, 7, 5, 7, 3, 23, 4, 11, 9, 10, 6, 8, 1, 19, 13, 1, 1, 21, 23, 8, 2, 2, 13, 2, 0, 2, 25, 25, 15, 21, 15, 5, 9, 12, 6, 11, 11, 0, 12, 13, 14, 15, 7, 20, 7, 22, 2, 8, 10, 24, 3, 24, 7, 17, 5, 13, 12, 12, 21, 25, 16, 20, 2, 0, 6, 23, 19, 4, 0]</a:t>
+            </a:r>
+          </a:p>
+        </p:txBody>
+      </p:sp>
+    </p:spTree>
+    <p:extLst>
+      <p:ext uri="{BB962C8B-B14F-4D97-AF65-F5344CB8AC3E}">
+        <p14:creationId xmlns:p14="http://schemas.microsoft.com/office/powerpoint/2010/main" val="2088907051"/>
+      </p:ext>
+    </p:extLst>
+  </p:cSld>
+  <p:clrMapOvr>
+    <a:masterClrMapping/>
+  </p:clrMapOvr>
+</p:sld>
+</file>
+
+<file path=ppt/slides/slide11.xml><?xml version="1.0" encoding="utf-8"?>
+<p:sld xmlns:a="http://schemas.openxmlformats.org/drawingml/2006/main" xmlns:r="http://schemas.openxmlformats.org/officeDocument/2006/relationships" xmlns:p="http://schemas.openxmlformats.org/presentationml/2006/main">
+  <p:cSld>
+    <p:spTree>
+      <p:nvGrpSpPr>
+        <p:cNvPr id="1" name=""/>
+        <p:cNvGrpSpPr/>
+        <p:nvPr/>
+      </p:nvGrpSpPr>
+      <p:grpSpPr>
+        <a:xfrm>
+          <a:off x="0" y="0"/>
+          <a:ext cx="0" cy="0"/>
+          <a:chOff x="0" y="0"/>
+          <a:chExt cx="0" cy="0"/>
+        </a:xfrm>
+      </p:grpSpPr>
+      <p:sp>
+        <p:nvSpPr>
+          <p:cNvPr id="2" name="Titel 1">
+            <a:extLst>
+              <a:ext uri="{FF2B5EF4-FFF2-40B4-BE49-F238E27FC236}">
+                <a16:creationId xmlns:a16="http://schemas.microsoft.com/office/drawing/2014/main" id="{9EE6259C-8E17-43C1-815C-EC58FCDFCE07}"/>
+              </a:ext>
+            </a:extLst>
+          </p:cNvPr>
+          <p:cNvSpPr>
+            <a:spLocks noGrp="1"/>
+          </p:cNvSpPr>
+          <p:nvPr>
+            <p:ph type="title"/>
+          </p:nvPr>
+        </p:nvSpPr>
+        <p:spPr/>
+        <p:txBody>
+          <a:bodyPr/>
+          <a:lstStyle/>
+          <a:p>
+            <a:r>
+              <a:rPr lang="de-DE" dirty="0"/>
+              <a:t>ResNet50 (no.1) – Loss and </a:t>
+            </a:r>
+            <a:r>
+              <a:rPr lang="de-DE" dirty="0" err="1"/>
+              <a:t>Accuracy</a:t>
+            </a:r>
+            <a:endParaRPr lang="de-DE" dirty="0"/>
+          </a:p>
+        </p:txBody>
+      </p:sp>
+      <p:pic>
+        <p:nvPicPr>
+          <p:cNvPr id="3" name="Grafik 2">
+            <a:extLst>
+              <a:ext uri="{FF2B5EF4-FFF2-40B4-BE49-F238E27FC236}">
+                <a16:creationId xmlns:a16="http://schemas.microsoft.com/office/drawing/2014/main" id="{7447C229-39C6-4773-943C-F2A4300AAB34}"/>
+              </a:ext>
+            </a:extLst>
+          </p:cNvPr>
+          <p:cNvPicPr>
+            <a:picLocks noChangeAspect="1"/>
+          </p:cNvPicPr>
+          <p:nvPr/>
+        </p:nvPicPr>
+        <p:blipFill>
+          <a:blip r:embed="rId2"/>
+          <a:stretch>
+            <a:fillRect/>
+          </a:stretch>
+        </p:blipFill>
+        <p:spPr>
+          <a:xfrm>
+            <a:off x="2076945" y="1481447"/>
+            <a:ext cx="8038110" cy="4822866"/>
+          </a:xfrm>
+          <a:prstGeom prst="rect">
+            <a:avLst/>
+          </a:prstGeom>
+        </p:spPr>
+      </p:pic>
+    </p:spTree>
+    <p:extLst>
+      <p:ext uri="{BB962C8B-B14F-4D97-AF65-F5344CB8AC3E}">
+        <p14:creationId xmlns:p14="http://schemas.microsoft.com/office/powerpoint/2010/main" val="533568223"/>
+      </p:ext>
+    </p:extLst>
+  </p:cSld>
+  <p:clrMapOvr>
+    <a:masterClrMapping/>
+  </p:clrMapOvr>
+</p:sld>
+</file>
+
+<file path=ppt/slides/slide12.xml><?xml version="1.0" encoding="utf-8"?>
+<p:sld xmlns:a="http://schemas.openxmlformats.org/drawingml/2006/main" xmlns:r="http://schemas.openxmlformats.org/officeDocument/2006/relationships" xmlns:p="http://schemas.openxmlformats.org/presentationml/2006/main">
+  <p:cSld>
+    <p:spTree>
+      <p:nvGrpSpPr>
+        <p:cNvPr id="1" name=""/>
+        <p:cNvGrpSpPr/>
+        <p:nvPr/>
+      </p:nvGrpSpPr>
+      <p:grpSpPr>
+        <a:xfrm>
+          <a:off x="0" y="0"/>
+          <a:ext cx="0" cy="0"/>
+          <a:chOff x="0" y="0"/>
+          <a:chExt cx="0" cy="0"/>
+        </a:xfrm>
+      </p:grpSpPr>
+      <p:sp>
+        <p:nvSpPr>
+          <p:cNvPr id="2" name="Titel 1">
+            <a:extLst>
+              <a:ext uri="{FF2B5EF4-FFF2-40B4-BE49-F238E27FC236}">
+                <a16:creationId xmlns:a16="http://schemas.microsoft.com/office/drawing/2014/main" id="{9EE6259C-8E17-43C1-815C-EC58FCDFCE07}"/>
+              </a:ext>
+            </a:extLst>
+          </p:cNvPr>
+          <p:cNvSpPr>
+            <a:spLocks noGrp="1"/>
+          </p:cNvSpPr>
+          <p:nvPr>
+            <p:ph type="title"/>
+          </p:nvPr>
+        </p:nvSpPr>
+        <p:spPr/>
+        <p:txBody>
+          <a:bodyPr/>
+          <a:lstStyle/>
+          <a:p>
+            <a:r>
+              <a:rPr lang="de-DE" dirty="0"/>
+              <a:t>ResNet50 (no.1) – </a:t>
+            </a:r>
+            <a:r>
+              <a:rPr lang="de-DE" dirty="0" err="1"/>
+              <a:t>Saliency</a:t>
+            </a:r>
+            <a:r>
+              <a:rPr lang="de-DE" dirty="0"/>
+              <a:t> Maps</a:t>
+            </a:r>
+          </a:p>
+        </p:txBody>
+      </p:sp>
+      <p:pic>
+        <p:nvPicPr>
+          <p:cNvPr id="3" name="Grafik 2">
+            <a:extLst>
+              <a:ext uri="{FF2B5EF4-FFF2-40B4-BE49-F238E27FC236}">
+                <a16:creationId xmlns:a16="http://schemas.microsoft.com/office/drawing/2014/main" id="{169A3B40-082B-4B32-9393-3852359890FB}"/>
+              </a:ext>
+            </a:extLst>
+          </p:cNvPr>
+          <p:cNvPicPr>
+            <a:picLocks noChangeAspect="1"/>
+          </p:cNvPicPr>
+          <p:nvPr/>
+        </p:nvPicPr>
+        <p:blipFill>
+          <a:blip r:embed="rId2"/>
+          <a:stretch>
+            <a:fillRect/>
+          </a:stretch>
+        </p:blipFill>
+        <p:spPr>
+          <a:xfrm>
+            <a:off x="838200" y="1690688"/>
+            <a:ext cx="2133600" cy="2133600"/>
+          </a:xfrm>
+          <a:prstGeom prst="rect">
+            <a:avLst/>
+          </a:prstGeom>
+        </p:spPr>
+      </p:pic>
+      <p:pic>
+        <p:nvPicPr>
+          <p:cNvPr id="5" name="Grafik 4">
+            <a:extLst>
+              <a:ext uri="{FF2B5EF4-FFF2-40B4-BE49-F238E27FC236}">
+                <a16:creationId xmlns:a16="http://schemas.microsoft.com/office/drawing/2014/main" id="{31DFF791-4537-4BEC-AA27-24A93D9871A1}"/>
+              </a:ext>
+            </a:extLst>
+          </p:cNvPr>
+          <p:cNvPicPr>
+            <a:picLocks noChangeAspect="1"/>
+          </p:cNvPicPr>
+          <p:nvPr/>
+        </p:nvPicPr>
+        <p:blipFill>
+          <a:blip r:embed="rId3">
+            <a:extLst>
+              <a:ext uri="{28A0092B-C50C-407E-A947-70E740481C1C}">
+                <a14:useLocalDpi xmlns:a14="http://schemas.microsoft.com/office/drawing/2010/main" val="0"/>
+              </a:ext>
+            </a:extLst>
+          </a:blip>
+          <a:stretch>
+            <a:fillRect/>
+          </a:stretch>
+        </p:blipFill>
+        <p:spPr>
+          <a:xfrm>
+            <a:off x="3348842" y="1690688"/>
+            <a:ext cx="2133600" cy="2133600"/>
+          </a:xfrm>
+          <a:prstGeom prst="rect">
+            <a:avLst/>
+          </a:prstGeom>
+        </p:spPr>
+      </p:pic>
+      <p:pic>
+        <p:nvPicPr>
+          <p:cNvPr id="7" name="Grafik 6">
+            <a:extLst>
+              <a:ext uri="{FF2B5EF4-FFF2-40B4-BE49-F238E27FC236}">
+                <a16:creationId xmlns:a16="http://schemas.microsoft.com/office/drawing/2014/main" id="{F99E93FB-E819-457C-B4E9-C9415778AD84}"/>
+              </a:ext>
+            </a:extLst>
+          </p:cNvPr>
+          <p:cNvPicPr>
+            <a:picLocks noChangeAspect="1"/>
+          </p:cNvPicPr>
+          <p:nvPr/>
+        </p:nvPicPr>
+        <p:blipFill>
+          <a:blip r:embed="rId4">
+            <a:extLst>
+              <a:ext uri="{28A0092B-C50C-407E-A947-70E740481C1C}">
+                <a14:useLocalDpi xmlns:a14="http://schemas.microsoft.com/office/drawing/2010/main" val="0"/>
+              </a:ext>
+            </a:extLst>
+          </a:blip>
+          <a:stretch>
+            <a:fillRect/>
+          </a:stretch>
+        </p:blipFill>
+        <p:spPr>
+          <a:xfrm>
+            <a:off x="5859484" y="1690688"/>
+            <a:ext cx="2133600" cy="2133600"/>
+          </a:xfrm>
+          <a:prstGeom prst="rect">
+            <a:avLst/>
+          </a:prstGeom>
+        </p:spPr>
+      </p:pic>
+      <p:pic>
+        <p:nvPicPr>
+          <p:cNvPr id="9" name="Grafik 8">
+            <a:extLst>
+              <a:ext uri="{FF2B5EF4-FFF2-40B4-BE49-F238E27FC236}">
+                <a16:creationId xmlns:a16="http://schemas.microsoft.com/office/drawing/2014/main" id="{F83F5F9E-F558-4F36-8641-8554C0647776}"/>
+              </a:ext>
+            </a:extLst>
+          </p:cNvPr>
+          <p:cNvPicPr>
+            <a:picLocks noChangeAspect="1"/>
+          </p:cNvPicPr>
+          <p:nvPr/>
+        </p:nvPicPr>
+        <p:blipFill>
+          <a:blip r:embed="rId5">
+            <a:extLst>
+              <a:ext uri="{28A0092B-C50C-407E-A947-70E740481C1C}">
+                <a14:useLocalDpi xmlns:a14="http://schemas.microsoft.com/office/drawing/2010/main" val="0"/>
+              </a:ext>
+            </a:extLst>
+          </a:blip>
+          <a:stretch>
+            <a:fillRect/>
+          </a:stretch>
+        </p:blipFill>
+        <p:spPr>
+          <a:xfrm>
+            <a:off x="8370126" y="1690688"/>
+            <a:ext cx="2133600" cy="2133600"/>
+          </a:xfrm>
+          <a:prstGeom prst="rect">
+            <a:avLst/>
+          </a:prstGeom>
+        </p:spPr>
+      </p:pic>
+      <p:pic>
+        <p:nvPicPr>
+          <p:cNvPr id="11" name="Grafik 10">
+            <a:extLst>
+              <a:ext uri="{FF2B5EF4-FFF2-40B4-BE49-F238E27FC236}">
+                <a16:creationId xmlns:a16="http://schemas.microsoft.com/office/drawing/2014/main" id="{CCE0293C-8429-4206-B338-D91F94DFD77F}"/>
+              </a:ext>
+            </a:extLst>
+          </p:cNvPr>
+          <p:cNvPicPr>
+            <a:picLocks noChangeAspect="1"/>
+          </p:cNvPicPr>
+          <p:nvPr/>
+        </p:nvPicPr>
+        <p:blipFill>
+          <a:blip r:embed="rId6">
+            <a:extLst>
+              <a:ext uri="{28A0092B-C50C-407E-A947-70E740481C1C}">
+                <a14:useLocalDpi xmlns:a14="http://schemas.microsoft.com/office/drawing/2010/main" val="0"/>
+              </a:ext>
+            </a:extLst>
+          </a:blip>
+          <a:stretch>
+            <a:fillRect/>
+          </a:stretch>
+        </p:blipFill>
+        <p:spPr>
+          <a:xfrm>
+            <a:off x="838200" y="4315691"/>
+            <a:ext cx="2133600" cy="2133600"/>
+          </a:xfrm>
+          <a:prstGeom prst="rect">
+            <a:avLst/>
+          </a:prstGeom>
+        </p:spPr>
+      </p:pic>
+      <p:pic>
+        <p:nvPicPr>
+          <p:cNvPr id="13" name="Grafik 12">
+            <a:extLst>
+              <a:ext uri="{FF2B5EF4-FFF2-40B4-BE49-F238E27FC236}">
+                <a16:creationId xmlns:a16="http://schemas.microsoft.com/office/drawing/2014/main" id="{C02EB894-088B-4405-AEFB-A27CF32E7E59}"/>
+              </a:ext>
+            </a:extLst>
+          </p:cNvPr>
+          <p:cNvPicPr>
+            <a:picLocks noChangeAspect="1"/>
+          </p:cNvPicPr>
+          <p:nvPr/>
+        </p:nvPicPr>
+        <p:blipFill>
+          <a:blip r:embed="rId7">
+            <a:extLst>
+              <a:ext uri="{28A0092B-C50C-407E-A947-70E740481C1C}">
+                <a14:useLocalDpi xmlns:a14="http://schemas.microsoft.com/office/drawing/2010/main" val="0"/>
+              </a:ext>
+            </a:extLst>
+          </a:blip>
+          <a:stretch>
+            <a:fillRect/>
+          </a:stretch>
+        </p:blipFill>
+        <p:spPr>
+          <a:xfrm>
+            <a:off x="3348842" y="4315691"/>
+            <a:ext cx="2133600" cy="2133600"/>
+          </a:xfrm>
+          <a:prstGeom prst="rect">
+            <a:avLst/>
+          </a:prstGeom>
+        </p:spPr>
+      </p:pic>
+      <p:pic>
+        <p:nvPicPr>
+          <p:cNvPr id="15" name="Grafik 14">
+            <a:extLst>
+              <a:ext uri="{FF2B5EF4-FFF2-40B4-BE49-F238E27FC236}">
+                <a16:creationId xmlns:a16="http://schemas.microsoft.com/office/drawing/2014/main" id="{B82DDFC0-D94C-4623-BA97-035AC1DD7C06}"/>
+              </a:ext>
+            </a:extLst>
+          </p:cNvPr>
+          <p:cNvPicPr>
+            <a:picLocks noChangeAspect="1"/>
+          </p:cNvPicPr>
+          <p:nvPr/>
+        </p:nvPicPr>
+        <p:blipFill>
+          <a:blip r:embed="rId8">
+            <a:extLst>
+              <a:ext uri="{28A0092B-C50C-407E-A947-70E740481C1C}">
+                <a14:useLocalDpi xmlns:a14="http://schemas.microsoft.com/office/drawing/2010/main" val="0"/>
+              </a:ext>
+            </a:extLst>
+          </a:blip>
+          <a:stretch>
+            <a:fillRect/>
+          </a:stretch>
+        </p:blipFill>
+        <p:spPr>
+          <a:xfrm>
+            <a:off x="5859484" y="4315691"/>
+            <a:ext cx="2133600" cy="2133600"/>
+          </a:xfrm>
+          <a:prstGeom prst="rect">
+            <a:avLst/>
+          </a:prstGeom>
+        </p:spPr>
+      </p:pic>
+      <p:pic>
+        <p:nvPicPr>
+          <p:cNvPr id="17" name="Grafik 16">
+            <a:extLst>
+              <a:ext uri="{FF2B5EF4-FFF2-40B4-BE49-F238E27FC236}">
+                <a16:creationId xmlns:a16="http://schemas.microsoft.com/office/drawing/2014/main" id="{C4D52B24-049C-445C-A756-2F40706C423E}"/>
+              </a:ext>
+            </a:extLst>
+          </p:cNvPr>
+          <p:cNvPicPr>
+            <a:picLocks noChangeAspect="1"/>
+          </p:cNvPicPr>
+          <p:nvPr/>
+        </p:nvPicPr>
+        <p:blipFill>
+          <a:blip r:embed="rId9">
+            <a:extLst>
+              <a:ext uri="{28A0092B-C50C-407E-A947-70E740481C1C}">
+                <a14:useLocalDpi xmlns:a14="http://schemas.microsoft.com/office/drawing/2010/main" val="0"/>
+              </a:ext>
+            </a:extLst>
+          </a:blip>
+          <a:stretch>
+            <a:fillRect/>
+          </a:stretch>
+        </p:blipFill>
+        <p:spPr>
+          <a:xfrm>
+            <a:off x="8370126" y="4315691"/>
+            <a:ext cx="2133600" cy="2133600"/>
+          </a:xfrm>
+          <a:prstGeom prst="rect">
+            <a:avLst/>
+          </a:prstGeom>
+        </p:spPr>
+      </p:pic>
+    </p:spTree>
+    <p:extLst>
+      <p:ext uri="{BB962C8B-B14F-4D97-AF65-F5344CB8AC3E}">
+        <p14:creationId xmlns:p14="http://schemas.microsoft.com/office/powerpoint/2010/main" val="652389758"/>
+      </p:ext>
+    </p:extLst>
+  </p:cSld>
+  <p:clrMapOvr>
+    <a:masterClrMapping/>
+  </p:clrMapOvr>
+</p:sld>
+</file>
+
 <file path=ppt/slides/slide2.xml><?xml version="1.0" encoding="utf-8"?>
 <p:sld xmlns:a="http://schemas.openxmlformats.org/drawingml/2006/main" xmlns:r="http://schemas.openxmlformats.org/officeDocument/2006/relationships" xmlns:p="http://schemas.openxmlformats.org/presentationml/2006/main">
   <p:cSld>
@@ -3566,6 +4171,1065 @@
     <p:extLst>
       <p:ext uri="{BB962C8B-B14F-4D97-AF65-F5344CB8AC3E}">
         <p14:creationId xmlns:p14="http://schemas.microsoft.com/office/powerpoint/2010/main" val="952229307"/>
+      </p:ext>
+    </p:extLst>
+  </p:cSld>
+  <p:clrMapOvr>
+    <a:masterClrMapping/>
+  </p:clrMapOvr>
+</p:sld>
+</file>
+
+<file path=ppt/slides/slide4.xml><?xml version="1.0" encoding="utf-8"?>
+<p:sld xmlns:a="http://schemas.openxmlformats.org/drawingml/2006/main" xmlns:r="http://schemas.openxmlformats.org/officeDocument/2006/relationships" xmlns:p="http://schemas.openxmlformats.org/presentationml/2006/main">
+  <p:cSld>
+    <p:spTree>
+      <p:nvGrpSpPr>
+        <p:cNvPr id="1" name=""/>
+        <p:cNvGrpSpPr/>
+        <p:nvPr/>
+      </p:nvGrpSpPr>
+      <p:grpSpPr>
+        <a:xfrm>
+          <a:off x="0" y="0"/>
+          <a:ext cx="0" cy="0"/>
+          <a:chOff x="0" y="0"/>
+          <a:chExt cx="0" cy="0"/>
+        </a:xfrm>
+      </p:grpSpPr>
+      <p:sp>
+        <p:nvSpPr>
+          <p:cNvPr id="2" name="Titel 1">
+            <a:extLst>
+              <a:ext uri="{FF2B5EF4-FFF2-40B4-BE49-F238E27FC236}">
+                <a16:creationId xmlns:a16="http://schemas.microsoft.com/office/drawing/2014/main" id="{9EE6259C-8E17-43C1-815C-EC58FCDFCE07}"/>
+              </a:ext>
+            </a:extLst>
+          </p:cNvPr>
+          <p:cNvSpPr>
+            <a:spLocks noGrp="1"/>
+          </p:cNvSpPr>
+          <p:nvPr>
+            <p:ph type="title"/>
+          </p:nvPr>
+        </p:nvSpPr>
+        <p:spPr/>
+        <p:txBody>
+          <a:bodyPr/>
+          <a:lstStyle/>
+          <a:p>
+            <a:r>
+              <a:rPr lang="de-DE" dirty="0"/>
+              <a:t>Vision Transformer (no.1) – </a:t>
+            </a:r>
+            <a:r>
+              <a:rPr lang="de-DE" dirty="0" err="1"/>
+              <a:t>Confusion</a:t>
+            </a:r>
+            <a:r>
+              <a:rPr lang="de-DE" dirty="0"/>
+              <a:t> Matrix</a:t>
+            </a:r>
+          </a:p>
+        </p:txBody>
+      </p:sp>
+      <p:pic>
+        <p:nvPicPr>
+          <p:cNvPr id="3" name="Grafik 2">
+            <a:extLst>
+              <a:ext uri="{FF2B5EF4-FFF2-40B4-BE49-F238E27FC236}">
+                <a16:creationId xmlns:a16="http://schemas.microsoft.com/office/drawing/2014/main" id="{5F9C2164-257F-4FBE-811F-AF875CACCA96}"/>
+              </a:ext>
+            </a:extLst>
+          </p:cNvPr>
+          <p:cNvPicPr>
+            <a:picLocks noChangeAspect="1"/>
+          </p:cNvPicPr>
+          <p:nvPr/>
+        </p:nvPicPr>
+        <p:blipFill>
+          <a:blip r:embed="rId2"/>
+          <a:stretch>
+            <a:fillRect/>
+          </a:stretch>
+        </p:blipFill>
+        <p:spPr>
+          <a:xfrm>
+            <a:off x="2091670" y="1553960"/>
+            <a:ext cx="6820762" cy="4774534"/>
+          </a:xfrm>
+          <a:prstGeom prst="rect">
+            <a:avLst/>
+          </a:prstGeom>
+        </p:spPr>
+      </p:pic>
+    </p:spTree>
+    <p:extLst>
+      <p:ext uri="{BB962C8B-B14F-4D97-AF65-F5344CB8AC3E}">
+        <p14:creationId xmlns:p14="http://schemas.microsoft.com/office/powerpoint/2010/main" val="1003666641"/>
+      </p:ext>
+    </p:extLst>
+  </p:cSld>
+  <p:clrMapOvr>
+    <a:masterClrMapping/>
+  </p:clrMapOvr>
+</p:sld>
+</file>
+
+<file path=ppt/slides/slide5.xml><?xml version="1.0" encoding="utf-8"?>
+<p:sld xmlns:a="http://schemas.openxmlformats.org/drawingml/2006/main" xmlns:r="http://schemas.openxmlformats.org/officeDocument/2006/relationships" xmlns:p="http://schemas.openxmlformats.org/presentationml/2006/main">
+  <p:cSld>
+    <p:spTree>
+      <p:nvGrpSpPr>
+        <p:cNvPr id="1" name=""/>
+        <p:cNvGrpSpPr/>
+        <p:nvPr/>
+      </p:nvGrpSpPr>
+      <p:grpSpPr>
+        <a:xfrm>
+          <a:off x="0" y="0"/>
+          <a:ext cx="0" cy="0"/>
+          <a:chOff x="0" y="0"/>
+          <a:chExt cx="0" cy="0"/>
+        </a:xfrm>
+      </p:grpSpPr>
+      <p:sp>
+        <p:nvSpPr>
+          <p:cNvPr id="4" name="Textfeld 3">
+            <a:extLst>
+              <a:ext uri="{FF2B5EF4-FFF2-40B4-BE49-F238E27FC236}">
+                <a16:creationId xmlns:a16="http://schemas.microsoft.com/office/drawing/2014/main" id="{B6EA9917-7A82-410D-9CE7-B05AB59C6930}"/>
+              </a:ext>
+            </a:extLst>
+          </p:cNvPr>
+          <p:cNvSpPr txBox="1"/>
+          <p:nvPr/>
+        </p:nvSpPr>
+        <p:spPr>
+          <a:xfrm>
+            <a:off x="283028" y="2654134"/>
+            <a:ext cx="11625944" cy="2123658"/>
+          </a:xfrm>
+          <a:prstGeom prst="rect">
+            <a:avLst/>
+          </a:prstGeom>
+          <a:noFill/>
+        </p:spPr>
+        <p:txBody>
+          <a:bodyPr wrap="square">
+            <a:spAutoFit/>
+          </a:bodyPr>
+          <a:lstStyle/>
+          <a:p>
+            <a:r>
+              <a:rPr lang="de-DE" sz="600" b="1" u="sng" dirty="0"/>
+              <a:t>Labels Testdaten: </a:t>
+            </a:r>
+          </a:p>
+          <a:p>
+            <a:r>
+              <a:rPr lang="de-DE" sz="600" dirty="0"/>
+              <a:t>[12, 2, 4, 1, 22, 24, 8, 5, 22, 16, 10, 6, 16, 21, 9, 1, 13, 0, 21, 0, 15, 0, 25, 24, 17, 1, 4, 14, 10, 10, 5, 23, 25, 15, 5, 12, 7, 1, 13, 8, 7, 2, 21, 2, 22, 2, 15, 18, 15, 1, 9, 1, 6, 7, 6, 17, 2, 7, 11, 21, 18, 0, 18, 6, 13, 0, 1, 2, 10, 1, 25, 22, 16, 13, 3, 23, 10, 5, 20, 15, 6, 25, 14, 15, 2, 3, 5, 6, 10, 18, 8, 3, 22, 2, 3, 10, 9, 8, 25, 5, 4, 8, 11, 1, 18, 25, 11, 22, 4, 14, 8, 17, 8, 21, 19, 0, 12, 0, 1, 3, 2, 15, 3, 3, 14, 13, 15, 25, 6, 21, 16, 4, 19, 22, </a:t>
+            </a:r>
+          </a:p>
+          <a:p>
+            <a:r>
+              <a:rPr lang="de-DE" sz="600" dirty="0"/>
+              <a:t>22, 2, 23, 21, 19, 4, 12, 12, 7, 24, 16, 11, 16, 5, 7, 6, 0, 11, 17, 5, 0, 14, 21, 22, 22, 25, 19, 11, 24, 21, 24, 10, 16, 4, 6, 22, 18, 1, 1, 9, 20, 11, 8, 25, 19, 24, 7, 10, 16, 5, 23, 17, 3, 22, 10, 15, 17, 24, 0, 17, 2, 18, 12, 20, 18, 9, 1, 18, 6, 3, 4, 6, 5, 10, 16, 4, 24, 7, 9, 17, 20, 4, 19, 25, 23, 1, 1, 25, 18, 12, 0, 12, 25, 12, 21, 3, 5, 20, 24, 13, 25, 13, 25, 14, 17, 6, 7, 9, 13, 25, 5, 23, 18, 16, 1, 16, 11, 0, 25, 3, 18, 7, 6, 11, 0, 7, 9, 22, 14, 12, 23, 12, 23, 7, 10, 0, 23, 6, 22, 12, 4, 7, 22, 9, 14, 8, 3, 2, 16, 25, 7, 13, 17, 24, 12, 2, 13, 23, 8, 6, 5, 23, 21, 9, 18, 8, 8, 24, 4, 2, 23, 8, 21, 22, 0, 19, 16, 20, 9, 24, 20, 13, 5, 12, 21, 13, 19, 24, 21, 0, 18, 17, 12, 5, 22, 15, 11, 0, 25, 21, 6, 23, 20, 9, 21, 24, 19, 11, 11, 14, 2, 23, 13, 10, 20, 16, 7, 10, 0, 20, 12, 1, 12, 2, 20, 25, 2, 4, 20, 8, 23, 19, 21, 9, 19, 8, 25, 12, 11, 13, 1, 20, 0, 5, 22, 11, 11, 7, 2, 13, 17, 23, 2, 14, 10, 12, 17, 24, 9, 14, 8, 10, 25, 24, 23, 7, 18, 14, 1, </a:t>
+            </a:r>
+          </a:p>
+          <a:p>
+            <a:r>
+              <a:rPr lang="de-DE" sz="600" dirty="0"/>
+              <a:t>4, 12, 10, 20, 23, 18, 22, 11, 8, 19, 4, 15, 3, 1, 7, 13, 22, 13, 18, 8, 3, 23, 17, 19, 10, 16, 5, 25, 18, 24, 11, 17, 15, 13, 9, 14, 14, 9, 19, 4, 2, 16, 9, 18, 0, 25, 3, 1, 20, 10, 25, 22, 21, 14, 7, 24, 21, 6, 10, 23, 2, 6, 15, 3, 11, 8, 15, </a:t>
+            </a:r>
+          </a:p>
+          <a:p>
+            <a:r>
+              <a:rPr lang="de-DE" sz="600" dirty="0"/>
+              <a:t>10, 11, 18, 16, 14, 18, 8, 10, 5, 11, 14, 1, 16, 4, 16, 22, 20, 9, 15, 17, 9, 5, 16, 3, 22, 21, 2, 11, 5, 3, 25, 0, 4, 15, 9, 25, 25, 3, 2, 0, 19, 17, 9, 12, 17, 3, 19, 6, 24, 5, 6, 18, 20, 14, 25, 17, 16, 24, 4, 5, 7, 10, 19, 12, 25, 3, 14, 5, </a:t>
+            </a:r>
+          </a:p>
+          <a:p>
+            <a:r>
+              <a:rPr lang="de-DE" sz="600" dirty="0"/>
+              <a:t>9, 7, 3, 18, 10, 13, 1, 11, 8, 0, 20, 3, 2, 15, 20, 11, 25, 7, 14, 2, 6, 2, 17, 2, 0, 24, 12, 13, 5, 7, 9, 20, 0, 15, 19, 6, 23, 15, 15, 5, 21, 6, 11, 16, 9, 6, 19, 15, 21, 23, 13, 15, 15, 1, 13, 10, 14, 24, 0, 8, 19, 1, 24, 23, 19, 9, 15, 21, 0, 22, 1, 24, 8, 23, 17, 12, 8, 5, 20, 14, 22, 18, 0, 21, 21, 21, 7, 17, 22, 24, 14, 12, 24, 19, 18, 13, 23, 12, 6, 15, 3, 10, 16, 18, 23, 11, 14, 11, 16, 23, 4, 10, 12, 19, 20, 1, 8, 14, 16, 21, 23, 19, 17, 19, 18, 16, 4, 16, 15, 17, 17, 6, 3, 4, 4, 13, 17, 3, 3, 21, 18, 16, 4, 24, 11, 14, 8, 8, 14, 13, 24, 4, 10, 7, 2, 8, 18, 12, 19, 7, 1, 6, 6, 22, 15, 7, 17, 8, 21, 9, 20, 11, 1, 20, 10, 19, 7, 5, 20, 0, 13, 6, 14, 8, 14, 3, 16, 1, 13, 11, 9, 15, 13, 22, 7, 5, 3, 15, 10, 24, 3, 6, 12, 9, 22, 5, 9, 2, 13, 23, 9, 4, 16, 23, 21, 12, 24, 20, 4, 0, 7, 19, 11, 20, 19, 20, 13, 17, 18, 22, 17, 17, 20, 2, 4, 5, 15, 4, 20, 19, 14, 4]</a:t>
+            </a:r>
+          </a:p>
+          <a:p>
+            <a:endParaRPr lang="de-DE" sz="600" dirty="0"/>
+          </a:p>
+          <a:p>
+            <a:r>
+              <a:rPr lang="de-DE" sz="600" b="1" u="sng" dirty="0"/>
+              <a:t>vorhergesagte Testdaten:</a:t>
+            </a:r>
+          </a:p>
+          <a:p>
+            <a:r>
+              <a:rPr lang="de-DE" sz="600" dirty="0"/>
+              <a:t> [12, 2, 4, 13, 22, 24, 25, 5, 22, 16, 10, 6, 16, 21, 9, 1, 13, 0, 21, 0, 15, 19, 25, 24, 17, 1, 8, 14, 10, 5, 5, 18, 25, 15, 5, 12, 7, 1, 13, 8, 7, 2, 21, 2, 22, 2, 15, 4, 15, 1, 9, 1, 6, 7, 6, 17, 2, 18, 11, 21, 18, 0, </a:t>
+            </a:r>
+          </a:p>
+          <a:p>
+            <a:r>
+              <a:rPr lang="de-DE" sz="600" dirty="0"/>
+              <a:t>13, 7, 13, 4, 1, 2, 10, 1, 25, 22, 16, 13, 3, 23, 10, 5, 20, 15, 7, 25, 14, 15, 20, 3, 5, 6, 10, 18, 8, 14, 22, 2, 3, 10, 2, 8, 25, 5, 4, 8, 11, 1, 25, 25, 11, 22, 4, 14, 8, 17, 8, 21, 19, 0, 12, 0, 1, 3, 2, 15, 3, 3, 14, 16, 15, 25, 6, 3, 16, 4, 19, 22, 22, 2, 4, 5, 19, 4, 12, 12, 7, 24, 16, 11, 16, 5, 7, 6, 0, 11, 17, 5, 0, 14, 10, 22, 22, 9, 19, 11, 24, 21, 24, 10, 16, 4, 6, 22, 18, 1, 1, 9, 20, 11, 8, 25, 19, 24, 7, 10, 16, 5, 23, 17, 3, 22, 10, 16, 17, 24, 0, 17, 2, 18, 0, 20, 18, 9, 1, 18, 6, 3, 4, 6, 5, 10, 16, 4, 24, 7, 9, 3, 9, 4, 19, 25, 23, 1, 1, 25, 18, 12, 19, 12, 25, 0, 21, 3, 5, 17, 3, 13, 25, 13, 25, 14, 17, 6, 2, 8, 13, 25, 5, 23, 18, 16, 1, 15, 11, 0, 25, 3, 18, 7, 13, 11, 0, 6, 9, 22, 14, 12, 19, 12, 23, 6, 10, 4, 23, 6, 22, 12, 4, 7, 22, 9, 14, 25, 3, 2, 16, 25, 7, 13, 17, 24, 12, 2, 13, 23, 4, 19, 5, 23, 21, 9, 4, 8, 11, 24, 4, 2, 23, 8, 21, 22, 0, 19, 16, 20, 9, 24, 20, 13, 5, 12, 21, 13, 19, 24, 21, 0, 20, 17, 12, 10, 22, 15, 11, 0, 25, 21, 6, 23, 20, 9, 21, 24, 19, 11, 11, 14, 2, 18, 13, 10, 20, 16, 7, 10, 0, 21, 12, 1, 12, 2, 20, 25, 2, 18, 20, 8, 19, 19, 21, 9, 19, 8, 25, 12, 11, 18, 1, 20, 0, 5, 22, 11, 11, 7, 2, 13, 17, 23, 7, 5, 10, 12, 21, 10, 9, 14, 8, 10, 25, 24, 23, 7, 8, 14, 1, 4, 12, 22, 20, 18, 18, 22, 11, 8, 19, 4, 16, 3, 1, 2, 13, 22, 13, 18, 8, 3, 19, 1, 19, 22, 16, 5, 25, 18, 24, 11, 17, 16, 13, 9, 14, 14, 9, 19, 4, 2, 16, 9, 19, 0, 25, 3, 1, 23, 10, 25, 22, 21, 14, 7, 24, 22, 6, 10, 23, 2, 6, 15, 3, 11, 8, 15, 10, 11, 18, 15, 14, 18, 1, 21, 5, 11, 14, 1, 16, 4, 16, 22, 20, 9, 15, 17, 9, 5, 16, 3, 25, 21, 2, 11, 5, 3, 25, 0, 4, 15, 9, 8, 25, 3, 2, 0, 19, 17, 8, 12, 17, 20, 19, 6, 24, 5, 8, 18, 20, 14, 25, 17, 16, 24, 4, 5, 7, 10, 19, 12, 25, 3, 14, 5, 9, 7, 3, 18, 10, 13, 6, 11, 8, 0, 20, 3, 2, 15, 20, 11, 8, 7, 14, 2, 6, 2, 17, 2, 0, 11, 12, 13, 5, 7, 9, 17, 0, 15, 19, 6, 23, 15, 15, 5, 21, 6, 11, 16, 9, 6, 19, 15, 21, 23, 13, 15, 15, 1, 4, 10, 14, 24, 0, 20, 19, 1, 14, 3, 0, 9, 15, 21, 0, 22, 1, 24, 25, 23, 17, 18, 8, 5, 20, 14, 22, 18, 0, 21, 21, 21, 7, 17, 21, 24, 14, 12, 10, 19, 18, 13, 23, 12, 6, 15, 3, 21, 16, 18, 23, 11, 14, 11, 16, 19, 4, 10, 12, 19, 20, 1, 8, 14, 16, 21, 19, 19, 17, 19, 18, 16, 4, 16, 15, 17, 17, 6, 3, 4, 12, 13, 17, 3, 10, 21, 23, 16, 4, 24, 11, 14, 8, 8, 14, 13, 24, 4, 10, 6, 2, 18, 18, 12, 19, 7, 1, 6, 6, 22, 15, 7, 17, 8, 21, 9, 20, 11, 1, 20, 22, 19, 7, 5, 20, 19, 1, 6, 14, 18, 14, 3, 16, 1, 13, 11, 9, 15, 13, 22, 7, 5, 3, 15, 10, 24, 8, 6, 12, 9, 22, 5, 9, 5, 13, 23, 9, 6, 16, 19, 11, 13, 24, 17, 4, 18, 7, 19, 11, 21, 23, 20, 13, 17, 8, 22, 17, 17, 4, 2, 4, 5, 15, 4, 20, 19, 14, 4]</a:t>
+            </a:r>
+          </a:p>
+          <a:p>
+            <a:r>
+              <a:rPr lang="de-DE" sz="600" dirty="0"/>
+              <a:t>[1, 2, 3, 4, 5, 6, 7, 8, 9, 10]</a:t>
+            </a:r>
+          </a:p>
+        </p:txBody>
+      </p:sp>
+      <p:sp>
+        <p:nvSpPr>
+          <p:cNvPr id="5" name="Titel 1">
+            <a:extLst>
+              <a:ext uri="{FF2B5EF4-FFF2-40B4-BE49-F238E27FC236}">
+                <a16:creationId xmlns:a16="http://schemas.microsoft.com/office/drawing/2014/main" id="{B714DE99-8892-4254-AD52-8AF8324C50CA}"/>
+              </a:ext>
+            </a:extLst>
+          </p:cNvPr>
+          <p:cNvSpPr txBox="1">
+            <a:spLocks/>
+          </p:cNvSpPr>
+          <p:nvPr/>
+        </p:nvSpPr>
+        <p:spPr>
+          <a:xfrm>
+            <a:off x="990600" y="517525"/>
+            <a:ext cx="10515600" cy="1325563"/>
+          </a:xfrm>
+          <a:prstGeom prst="rect">
+            <a:avLst/>
+          </a:prstGeom>
+        </p:spPr>
+        <p:txBody>
+          <a:bodyPr vert="horz" lIns="91440" tIns="45720" rIns="91440" bIns="45720" rtlCol="0" anchor="ctr">
+            <a:normAutofit/>
+          </a:bodyPr>
+          <a:lstStyle>
+            <a:lvl1pPr algn="l" defTabSz="914400" rtl="0" eaLnBrk="1" latinLnBrk="0" hangingPunct="1">
+              <a:lnSpc>
+                <a:spcPct val="90000"/>
+              </a:lnSpc>
+              <a:spcBef>
+                <a:spcPct val="0"/>
+              </a:spcBef>
+              <a:buNone/>
+              <a:defRPr sz="4400" kern="1200">
+                <a:solidFill>
+                  <a:schemeClr val="tx1"/>
+                </a:solidFill>
+                <a:latin typeface="+mj-lt"/>
+                <a:ea typeface="+mj-ea"/>
+                <a:cs typeface="+mj-cs"/>
+              </a:defRPr>
+            </a:lvl1pPr>
+          </a:lstStyle>
+          <a:p>
+            <a:r>
+              <a:rPr lang="de-DE" dirty="0"/>
+              <a:t>Vision Transformer (no.1) – Labels</a:t>
+            </a:r>
+          </a:p>
+        </p:txBody>
+      </p:sp>
+    </p:spTree>
+    <p:extLst>
+      <p:ext uri="{BB962C8B-B14F-4D97-AF65-F5344CB8AC3E}">
+        <p14:creationId xmlns:p14="http://schemas.microsoft.com/office/powerpoint/2010/main" val="630870120"/>
+      </p:ext>
+    </p:extLst>
+  </p:cSld>
+  <p:clrMapOvr>
+    <a:masterClrMapping/>
+  </p:clrMapOvr>
+</p:sld>
+</file>
+
+<file path=ppt/slides/slide6.xml><?xml version="1.0" encoding="utf-8"?>
+<p:sld xmlns:a="http://schemas.openxmlformats.org/drawingml/2006/main" xmlns:r="http://schemas.openxmlformats.org/officeDocument/2006/relationships" xmlns:p="http://schemas.openxmlformats.org/presentationml/2006/main">
+  <p:cSld>
+    <p:spTree>
+      <p:nvGrpSpPr>
+        <p:cNvPr id="1" name=""/>
+        <p:cNvGrpSpPr/>
+        <p:nvPr/>
+      </p:nvGrpSpPr>
+      <p:grpSpPr>
+        <a:xfrm>
+          <a:off x="0" y="0"/>
+          <a:ext cx="0" cy="0"/>
+          <a:chOff x="0" y="0"/>
+          <a:chExt cx="0" cy="0"/>
+        </a:xfrm>
+      </p:grpSpPr>
+      <p:sp>
+        <p:nvSpPr>
+          <p:cNvPr id="2" name="Titel 1">
+            <a:extLst>
+              <a:ext uri="{FF2B5EF4-FFF2-40B4-BE49-F238E27FC236}">
+                <a16:creationId xmlns:a16="http://schemas.microsoft.com/office/drawing/2014/main" id="{9EE6259C-8E17-43C1-815C-EC58FCDFCE07}"/>
+              </a:ext>
+            </a:extLst>
+          </p:cNvPr>
+          <p:cNvSpPr>
+            <a:spLocks noGrp="1"/>
+          </p:cNvSpPr>
+          <p:nvPr>
+            <p:ph type="title"/>
+          </p:nvPr>
+        </p:nvSpPr>
+        <p:spPr/>
+        <p:txBody>
+          <a:bodyPr/>
+          <a:lstStyle/>
+          <a:p>
+            <a:r>
+              <a:rPr lang="de-DE" dirty="0"/>
+              <a:t>Vision Transformer (no.1) – Loss and </a:t>
+            </a:r>
+            <a:r>
+              <a:rPr lang="de-DE" dirty="0" err="1"/>
+              <a:t>Accuracy</a:t>
+            </a:r>
+            <a:endParaRPr lang="de-DE" dirty="0"/>
+          </a:p>
+        </p:txBody>
+      </p:sp>
+      <p:pic>
+        <p:nvPicPr>
+          <p:cNvPr id="7" name="Grafik 6">
+            <a:extLst>
+              <a:ext uri="{FF2B5EF4-FFF2-40B4-BE49-F238E27FC236}">
+                <a16:creationId xmlns:a16="http://schemas.microsoft.com/office/drawing/2014/main" id="{CF5D92CE-ABCF-491C-AD20-65205CAC2BC8}"/>
+              </a:ext>
+            </a:extLst>
+          </p:cNvPr>
+          <p:cNvPicPr>
+            <a:picLocks noChangeAspect="1"/>
+          </p:cNvPicPr>
+          <p:nvPr/>
+        </p:nvPicPr>
+        <p:blipFill>
+          <a:blip r:embed="rId2">
+            <a:extLst>
+              <a:ext uri="{28A0092B-C50C-407E-A947-70E740481C1C}">
+                <a14:useLocalDpi xmlns:a14="http://schemas.microsoft.com/office/drawing/2010/main" val="0"/>
+              </a:ext>
+            </a:extLst>
+          </a:blip>
+          <a:stretch>
+            <a:fillRect/>
+          </a:stretch>
+        </p:blipFill>
+        <p:spPr>
+          <a:xfrm>
+            <a:off x="1781298" y="1749829"/>
+            <a:ext cx="8162315" cy="4897389"/>
+          </a:xfrm>
+          <a:prstGeom prst="rect">
+            <a:avLst/>
+          </a:prstGeom>
+        </p:spPr>
+      </p:pic>
+    </p:spTree>
+    <p:extLst>
+      <p:ext uri="{BB962C8B-B14F-4D97-AF65-F5344CB8AC3E}">
+        <p14:creationId xmlns:p14="http://schemas.microsoft.com/office/powerpoint/2010/main" val="4214830354"/>
+      </p:ext>
+    </p:extLst>
+  </p:cSld>
+  <p:clrMapOvr>
+    <a:masterClrMapping/>
+  </p:clrMapOvr>
+</p:sld>
+</file>
+
+<file path=ppt/slides/slide7.xml><?xml version="1.0" encoding="utf-8"?>
+<p:sld xmlns:a="http://schemas.openxmlformats.org/drawingml/2006/main" xmlns:r="http://schemas.openxmlformats.org/officeDocument/2006/relationships" xmlns:p="http://schemas.openxmlformats.org/presentationml/2006/main">
+  <p:cSld>
+    <p:spTree>
+      <p:nvGrpSpPr>
+        <p:cNvPr id="1" name=""/>
+        <p:cNvGrpSpPr/>
+        <p:nvPr/>
+      </p:nvGrpSpPr>
+      <p:grpSpPr>
+        <a:xfrm>
+          <a:off x="0" y="0"/>
+          <a:ext cx="0" cy="0"/>
+          <a:chOff x="0" y="0"/>
+          <a:chExt cx="0" cy="0"/>
+        </a:xfrm>
+      </p:grpSpPr>
+      <p:sp>
+        <p:nvSpPr>
+          <p:cNvPr id="2" name="Titel 1">
+            <a:extLst>
+              <a:ext uri="{FF2B5EF4-FFF2-40B4-BE49-F238E27FC236}">
+                <a16:creationId xmlns:a16="http://schemas.microsoft.com/office/drawing/2014/main" id="{9EE6259C-8E17-43C1-815C-EC58FCDFCE07}"/>
+              </a:ext>
+            </a:extLst>
+          </p:cNvPr>
+          <p:cNvSpPr>
+            <a:spLocks noGrp="1"/>
+          </p:cNvSpPr>
+          <p:nvPr>
+            <p:ph type="title"/>
+          </p:nvPr>
+        </p:nvSpPr>
+        <p:spPr/>
+        <p:txBody>
+          <a:bodyPr/>
+          <a:lstStyle/>
+          <a:p>
+            <a:r>
+              <a:rPr lang="de-DE" dirty="0"/>
+              <a:t>Vision Transformer (no.1) – </a:t>
+            </a:r>
+            <a:r>
+              <a:rPr lang="de-DE" dirty="0" err="1"/>
+              <a:t>Saliency</a:t>
+            </a:r>
+            <a:r>
+              <a:rPr lang="de-DE" dirty="0"/>
+              <a:t> Maps</a:t>
+            </a:r>
+          </a:p>
+        </p:txBody>
+      </p:sp>
+      <p:pic>
+        <p:nvPicPr>
+          <p:cNvPr id="18" name="Grafik 17">
+            <a:extLst>
+              <a:ext uri="{FF2B5EF4-FFF2-40B4-BE49-F238E27FC236}">
+                <a16:creationId xmlns:a16="http://schemas.microsoft.com/office/drawing/2014/main" id="{50E7E37D-C9D6-497C-9462-1847C520EF17}"/>
+              </a:ext>
+            </a:extLst>
+          </p:cNvPr>
+          <p:cNvPicPr>
+            <a:picLocks noChangeAspect="1"/>
+          </p:cNvPicPr>
+          <p:nvPr/>
+        </p:nvPicPr>
+        <p:blipFill>
+          <a:blip r:embed="rId2">
+            <a:extLst>
+              <a:ext uri="{28A0092B-C50C-407E-A947-70E740481C1C}">
+                <a14:useLocalDpi xmlns:a14="http://schemas.microsoft.com/office/drawing/2010/main" val="0"/>
+              </a:ext>
+            </a:extLst>
+          </a:blip>
+          <a:stretch>
+            <a:fillRect/>
+          </a:stretch>
+        </p:blipFill>
+        <p:spPr>
+          <a:xfrm>
+            <a:off x="838200" y="1690688"/>
+            <a:ext cx="2133600" cy="2133600"/>
+          </a:xfrm>
+          <a:prstGeom prst="rect">
+            <a:avLst/>
+          </a:prstGeom>
+        </p:spPr>
+      </p:pic>
+      <p:pic>
+        <p:nvPicPr>
+          <p:cNvPr id="20" name="Grafik 19">
+            <a:extLst>
+              <a:ext uri="{FF2B5EF4-FFF2-40B4-BE49-F238E27FC236}">
+                <a16:creationId xmlns:a16="http://schemas.microsoft.com/office/drawing/2014/main" id="{B65397EF-5233-4329-A2BC-B9FD0E3D4552}"/>
+              </a:ext>
+            </a:extLst>
+          </p:cNvPr>
+          <p:cNvPicPr>
+            <a:picLocks noChangeAspect="1"/>
+          </p:cNvPicPr>
+          <p:nvPr/>
+        </p:nvPicPr>
+        <p:blipFill>
+          <a:blip r:embed="rId3">
+            <a:extLst>
+              <a:ext uri="{28A0092B-C50C-407E-A947-70E740481C1C}">
+                <a14:useLocalDpi xmlns:a14="http://schemas.microsoft.com/office/drawing/2010/main" val="0"/>
+              </a:ext>
+            </a:extLst>
+          </a:blip>
+          <a:stretch>
+            <a:fillRect/>
+          </a:stretch>
+        </p:blipFill>
+        <p:spPr>
+          <a:xfrm>
+            <a:off x="3289465" y="1690688"/>
+            <a:ext cx="2133600" cy="2133600"/>
+          </a:xfrm>
+          <a:prstGeom prst="rect">
+            <a:avLst/>
+          </a:prstGeom>
+        </p:spPr>
+      </p:pic>
+      <p:pic>
+        <p:nvPicPr>
+          <p:cNvPr id="21" name="Grafik 20">
+            <a:extLst>
+              <a:ext uri="{FF2B5EF4-FFF2-40B4-BE49-F238E27FC236}">
+                <a16:creationId xmlns:a16="http://schemas.microsoft.com/office/drawing/2014/main" id="{A1DC1406-976B-4DCD-BED7-7DEC6E9D8CBB}"/>
+              </a:ext>
+            </a:extLst>
+          </p:cNvPr>
+          <p:cNvPicPr>
+            <a:picLocks noChangeAspect="1"/>
+          </p:cNvPicPr>
+          <p:nvPr/>
+        </p:nvPicPr>
+        <p:blipFill>
+          <a:blip r:embed="rId4"/>
+          <a:stretch>
+            <a:fillRect/>
+          </a:stretch>
+        </p:blipFill>
+        <p:spPr>
+          <a:xfrm>
+            <a:off x="5740730" y="1690688"/>
+            <a:ext cx="2133600" cy="2133600"/>
+          </a:xfrm>
+          <a:prstGeom prst="rect">
+            <a:avLst/>
+          </a:prstGeom>
+        </p:spPr>
+      </p:pic>
+      <p:pic>
+        <p:nvPicPr>
+          <p:cNvPr id="23" name="Grafik 22">
+            <a:extLst>
+              <a:ext uri="{FF2B5EF4-FFF2-40B4-BE49-F238E27FC236}">
+                <a16:creationId xmlns:a16="http://schemas.microsoft.com/office/drawing/2014/main" id="{8E0954D3-4692-42A3-AEF6-5F5F1DD717DF}"/>
+              </a:ext>
+            </a:extLst>
+          </p:cNvPr>
+          <p:cNvPicPr>
+            <a:picLocks noChangeAspect="1"/>
+          </p:cNvPicPr>
+          <p:nvPr/>
+        </p:nvPicPr>
+        <p:blipFill>
+          <a:blip r:embed="rId5">
+            <a:extLst>
+              <a:ext uri="{28A0092B-C50C-407E-A947-70E740481C1C}">
+                <a14:useLocalDpi xmlns:a14="http://schemas.microsoft.com/office/drawing/2010/main" val="0"/>
+              </a:ext>
+            </a:extLst>
+          </a:blip>
+          <a:stretch>
+            <a:fillRect/>
+          </a:stretch>
+        </p:blipFill>
+        <p:spPr>
+          <a:xfrm>
+            <a:off x="8191995" y="1690688"/>
+            <a:ext cx="2133600" cy="2133600"/>
+          </a:xfrm>
+          <a:prstGeom prst="rect">
+            <a:avLst/>
+          </a:prstGeom>
+        </p:spPr>
+      </p:pic>
+      <p:pic>
+        <p:nvPicPr>
+          <p:cNvPr id="24" name="Grafik 23">
+            <a:extLst>
+              <a:ext uri="{FF2B5EF4-FFF2-40B4-BE49-F238E27FC236}">
+                <a16:creationId xmlns:a16="http://schemas.microsoft.com/office/drawing/2014/main" id="{B3C25451-2B01-4511-B3D3-446047570DE5}"/>
+              </a:ext>
+            </a:extLst>
+          </p:cNvPr>
+          <p:cNvPicPr>
+            <a:picLocks noChangeAspect="1"/>
+          </p:cNvPicPr>
+          <p:nvPr/>
+        </p:nvPicPr>
+        <p:blipFill>
+          <a:blip r:embed="rId6"/>
+          <a:stretch>
+            <a:fillRect/>
+          </a:stretch>
+        </p:blipFill>
+        <p:spPr>
+          <a:xfrm>
+            <a:off x="838200" y="4173187"/>
+            <a:ext cx="2133600" cy="2133600"/>
+          </a:xfrm>
+          <a:prstGeom prst="rect">
+            <a:avLst/>
+          </a:prstGeom>
+        </p:spPr>
+      </p:pic>
+      <p:pic>
+        <p:nvPicPr>
+          <p:cNvPr id="26" name="Grafik 25">
+            <a:extLst>
+              <a:ext uri="{FF2B5EF4-FFF2-40B4-BE49-F238E27FC236}">
+                <a16:creationId xmlns:a16="http://schemas.microsoft.com/office/drawing/2014/main" id="{1367260E-8C66-4449-B88B-A196FD0908A7}"/>
+              </a:ext>
+            </a:extLst>
+          </p:cNvPr>
+          <p:cNvPicPr>
+            <a:picLocks noChangeAspect="1"/>
+          </p:cNvPicPr>
+          <p:nvPr/>
+        </p:nvPicPr>
+        <p:blipFill>
+          <a:blip r:embed="rId7">
+            <a:extLst>
+              <a:ext uri="{28A0092B-C50C-407E-A947-70E740481C1C}">
+                <a14:useLocalDpi xmlns:a14="http://schemas.microsoft.com/office/drawing/2010/main" val="0"/>
+              </a:ext>
+            </a:extLst>
+          </a:blip>
+          <a:stretch>
+            <a:fillRect/>
+          </a:stretch>
+        </p:blipFill>
+        <p:spPr>
+          <a:xfrm>
+            <a:off x="3289465" y="4173187"/>
+            <a:ext cx="2133600" cy="2133600"/>
+          </a:xfrm>
+          <a:prstGeom prst="rect">
+            <a:avLst/>
+          </a:prstGeom>
+        </p:spPr>
+      </p:pic>
+      <p:pic>
+        <p:nvPicPr>
+          <p:cNvPr id="28" name="Grafik 27">
+            <a:extLst>
+              <a:ext uri="{FF2B5EF4-FFF2-40B4-BE49-F238E27FC236}">
+                <a16:creationId xmlns:a16="http://schemas.microsoft.com/office/drawing/2014/main" id="{3385D22C-EE8A-4485-AE09-C19130CBE8C3}"/>
+              </a:ext>
+            </a:extLst>
+          </p:cNvPr>
+          <p:cNvPicPr>
+            <a:picLocks noChangeAspect="1"/>
+          </p:cNvPicPr>
+          <p:nvPr/>
+        </p:nvPicPr>
+        <p:blipFill>
+          <a:blip r:embed="rId8">
+            <a:extLst>
+              <a:ext uri="{28A0092B-C50C-407E-A947-70E740481C1C}">
+                <a14:useLocalDpi xmlns:a14="http://schemas.microsoft.com/office/drawing/2010/main" val="0"/>
+              </a:ext>
+            </a:extLst>
+          </a:blip>
+          <a:stretch>
+            <a:fillRect/>
+          </a:stretch>
+        </p:blipFill>
+        <p:spPr>
+          <a:xfrm>
+            <a:off x="5740730" y="4173187"/>
+            <a:ext cx="2133600" cy="2133600"/>
+          </a:xfrm>
+          <a:prstGeom prst="rect">
+            <a:avLst/>
+          </a:prstGeom>
+        </p:spPr>
+      </p:pic>
+      <p:pic>
+        <p:nvPicPr>
+          <p:cNvPr id="29" name="Grafik 28">
+            <a:extLst>
+              <a:ext uri="{FF2B5EF4-FFF2-40B4-BE49-F238E27FC236}">
+                <a16:creationId xmlns:a16="http://schemas.microsoft.com/office/drawing/2014/main" id="{467B77FF-95C2-44EA-AC51-9E575824E2C5}"/>
+              </a:ext>
+            </a:extLst>
+          </p:cNvPr>
+          <p:cNvPicPr>
+            <a:picLocks noChangeAspect="1"/>
+          </p:cNvPicPr>
+          <p:nvPr/>
+        </p:nvPicPr>
+        <p:blipFill>
+          <a:blip r:embed="rId9"/>
+          <a:stretch>
+            <a:fillRect/>
+          </a:stretch>
+        </p:blipFill>
+        <p:spPr>
+          <a:xfrm>
+            <a:off x="8191995" y="4173187"/>
+            <a:ext cx="2133600" cy="2133600"/>
+          </a:xfrm>
+          <a:prstGeom prst="rect">
+            <a:avLst/>
+          </a:prstGeom>
+        </p:spPr>
+      </p:pic>
+    </p:spTree>
+    <p:extLst>
+      <p:ext uri="{BB962C8B-B14F-4D97-AF65-F5344CB8AC3E}">
+        <p14:creationId xmlns:p14="http://schemas.microsoft.com/office/powerpoint/2010/main" val="876948217"/>
+      </p:ext>
+    </p:extLst>
+  </p:cSld>
+  <p:clrMapOvr>
+    <a:masterClrMapping/>
+  </p:clrMapOvr>
+</p:sld>
+</file>
+
+<file path=ppt/slides/slide8.xml><?xml version="1.0" encoding="utf-8"?>
+<p:sld xmlns:a="http://schemas.openxmlformats.org/drawingml/2006/main" xmlns:r="http://schemas.openxmlformats.org/officeDocument/2006/relationships" xmlns:p="http://schemas.openxmlformats.org/presentationml/2006/main">
+  <p:cSld>
+    <p:spTree>
+      <p:nvGrpSpPr>
+        <p:cNvPr id="1" name=""/>
+        <p:cNvGrpSpPr/>
+        <p:nvPr/>
+      </p:nvGrpSpPr>
+      <p:grpSpPr>
+        <a:xfrm>
+          <a:off x="0" y="0"/>
+          <a:ext cx="0" cy="0"/>
+          <a:chOff x="0" y="0"/>
+          <a:chExt cx="0" cy="0"/>
+        </a:xfrm>
+      </p:grpSpPr>
+      <p:sp>
+        <p:nvSpPr>
+          <p:cNvPr id="2" name="Titel 1">
+            <a:extLst>
+              <a:ext uri="{FF2B5EF4-FFF2-40B4-BE49-F238E27FC236}">
+                <a16:creationId xmlns:a16="http://schemas.microsoft.com/office/drawing/2014/main" id="{1F20CAF2-C127-4F0A-B316-19CC56055294}"/>
+              </a:ext>
+            </a:extLst>
+          </p:cNvPr>
+          <p:cNvSpPr>
+            <a:spLocks noGrp="1"/>
+          </p:cNvSpPr>
+          <p:nvPr>
+            <p:ph type="title"/>
+          </p:nvPr>
+        </p:nvSpPr>
+        <p:spPr/>
+        <p:txBody>
+          <a:bodyPr/>
+          <a:lstStyle/>
+          <a:p>
+            <a:r>
+              <a:rPr lang="de-DE" dirty="0"/>
+              <a:t>ResNet50 (no.1)</a:t>
+            </a:r>
+          </a:p>
+        </p:txBody>
+      </p:sp>
+      <p:sp>
+        <p:nvSpPr>
+          <p:cNvPr id="5" name="Inhaltsplatzhalter 2">
+            <a:extLst>
+              <a:ext uri="{FF2B5EF4-FFF2-40B4-BE49-F238E27FC236}">
+                <a16:creationId xmlns:a16="http://schemas.microsoft.com/office/drawing/2014/main" id="{64590773-EBBD-4338-B137-C3DAAB80D082}"/>
+              </a:ext>
+            </a:extLst>
+          </p:cNvPr>
+          <p:cNvSpPr txBox="1">
+            <a:spLocks/>
+          </p:cNvSpPr>
+          <p:nvPr/>
+        </p:nvSpPr>
+        <p:spPr>
+          <a:xfrm>
+            <a:off x="838200" y="1825625"/>
+            <a:ext cx="10515600" cy="4351338"/>
+          </a:xfrm>
+          <a:prstGeom prst="rect">
+            <a:avLst/>
+          </a:prstGeom>
+        </p:spPr>
+        <p:txBody>
+          <a:bodyPr/>
+          <a:lstStyle>
+            <a:lvl1pPr marL="228600" indent="-228600" algn="l" defTabSz="914400" rtl="0" eaLnBrk="1" latinLnBrk="0" hangingPunct="1">
+              <a:lnSpc>
+                <a:spcPct val="90000"/>
+              </a:lnSpc>
+              <a:spcBef>
+                <a:spcPts val="1000"/>
+              </a:spcBef>
+              <a:buFont typeface="Arial" panose="020B0604020202020204" pitchFamily="34" charset="0"/>
+              <a:buChar char="•"/>
+              <a:defRPr sz="2800" kern="1200">
+                <a:solidFill>
+                  <a:schemeClr val="tx1"/>
+                </a:solidFill>
+                <a:latin typeface="+mn-lt"/>
+                <a:ea typeface="+mn-ea"/>
+                <a:cs typeface="+mn-cs"/>
+              </a:defRPr>
+            </a:lvl1pPr>
+            <a:lvl2pPr marL="685800" indent="-228600" algn="l" defTabSz="914400" rtl="0" eaLnBrk="1" latinLnBrk="0" hangingPunct="1">
+              <a:lnSpc>
+                <a:spcPct val="90000"/>
+              </a:lnSpc>
+              <a:spcBef>
+                <a:spcPts val="500"/>
+              </a:spcBef>
+              <a:buFont typeface="Arial" panose="020B0604020202020204" pitchFamily="34" charset="0"/>
+              <a:buChar char="•"/>
+              <a:defRPr sz="2400" kern="1200">
+                <a:solidFill>
+                  <a:schemeClr val="tx1"/>
+                </a:solidFill>
+                <a:latin typeface="+mn-lt"/>
+                <a:ea typeface="+mn-ea"/>
+                <a:cs typeface="+mn-cs"/>
+              </a:defRPr>
+            </a:lvl2pPr>
+            <a:lvl3pPr marL="1143000" indent="-228600" algn="l" defTabSz="914400" rtl="0" eaLnBrk="1" latinLnBrk="0" hangingPunct="1">
+              <a:lnSpc>
+                <a:spcPct val="90000"/>
+              </a:lnSpc>
+              <a:spcBef>
+                <a:spcPts val="500"/>
+              </a:spcBef>
+              <a:buFont typeface="Arial" panose="020B0604020202020204" pitchFamily="34" charset="0"/>
+              <a:buChar char="•"/>
+              <a:defRPr sz="2000" kern="1200">
+                <a:solidFill>
+                  <a:schemeClr val="tx1"/>
+                </a:solidFill>
+                <a:latin typeface="+mn-lt"/>
+                <a:ea typeface="+mn-ea"/>
+                <a:cs typeface="+mn-cs"/>
+              </a:defRPr>
+            </a:lvl3pPr>
+            <a:lvl4pPr marL="1600200" indent="-228600" algn="l" defTabSz="914400" rtl="0" eaLnBrk="1" latinLnBrk="0" hangingPunct="1">
+              <a:lnSpc>
+                <a:spcPct val="90000"/>
+              </a:lnSpc>
+              <a:spcBef>
+                <a:spcPts val="500"/>
+              </a:spcBef>
+              <a:buFont typeface="Arial" panose="020B0604020202020204" pitchFamily="34" charset="0"/>
+              <a:buChar char="•"/>
+              <a:defRPr sz="1800" kern="1200">
+                <a:solidFill>
+                  <a:schemeClr val="tx1"/>
+                </a:solidFill>
+                <a:latin typeface="+mn-lt"/>
+                <a:ea typeface="+mn-ea"/>
+                <a:cs typeface="+mn-cs"/>
+              </a:defRPr>
+            </a:lvl4pPr>
+            <a:lvl5pPr marL="2057400" indent="-228600" algn="l" defTabSz="914400" rtl="0" eaLnBrk="1" latinLnBrk="0" hangingPunct="1">
+              <a:lnSpc>
+                <a:spcPct val="90000"/>
+              </a:lnSpc>
+              <a:spcBef>
+                <a:spcPts val="500"/>
+              </a:spcBef>
+              <a:buFont typeface="Arial" panose="020B0604020202020204" pitchFamily="34" charset="0"/>
+              <a:buChar char="•"/>
+              <a:defRPr sz="1800" kern="1200">
+                <a:solidFill>
+                  <a:schemeClr val="tx1"/>
+                </a:solidFill>
+                <a:latin typeface="+mn-lt"/>
+                <a:ea typeface="+mn-ea"/>
+                <a:cs typeface="+mn-cs"/>
+              </a:defRPr>
+            </a:lvl5pPr>
+            <a:lvl6pPr marL="2514600" indent="-228600" algn="l" defTabSz="914400" rtl="0" eaLnBrk="1" latinLnBrk="0" hangingPunct="1">
+              <a:lnSpc>
+                <a:spcPct val="90000"/>
+              </a:lnSpc>
+              <a:spcBef>
+                <a:spcPts val="500"/>
+              </a:spcBef>
+              <a:buFont typeface="Arial" panose="020B0604020202020204" pitchFamily="34" charset="0"/>
+              <a:buChar char="•"/>
+              <a:defRPr sz="1800" kern="1200">
+                <a:solidFill>
+                  <a:schemeClr val="tx1"/>
+                </a:solidFill>
+                <a:latin typeface="+mn-lt"/>
+                <a:ea typeface="+mn-ea"/>
+                <a:cs typeface="+mn-cs"/>
+              </a:defRPr>
+            </a:lvl6pPr>
+            <a:lvl7pPr marL="2971800" indent="-228600" algn="l" defTabSz="914400" rtl="0" eaLnBrk="1" latinLnBrk="0" hangingPunct="1">
+              <a:lnSpc>
+                <a:spcPct val="90000"/>
+              </a:lnSpc>
+              <a:spcBef>
+                <a:spcPts val="500"/>
+              </a:spcBef>
+              <a:buFont typeface="Arial" panose="020B0604020202020204" pitchFamily="34" charset="0"/>
+              <a:buChar char="•"/>
+              <a:defRPr sz="1800" kern="1200">
+                <a:solidFill>
+                  <a:schemeClr val="tx1"/>
+                </a:solidFill>
+                <a:latin typeface="+mn-lt"/>
+                <a:ea typeface="+mn-ea"/>
+                <a:cs typeface="+mn-cs"/>
+              </a:defRPr>
+            </a:lvl7pPr>
+            <a:lvl8pPr marL="3429000" indent="-228600" algn="l" defTabSz="914400" rtl="0" eaLnBrk="1" latinLnBrk="0" hangingPunct="1">
+              <a:lnSpc>
+                <a:spcPct val="90000"/>
+              </a:lnSpc>
+              <a:spcBef>
+                <a:spcPts val="500"/>
+              </a:spcBef>
+              <a:buFont typeface="Arial" panose="020B0604020202020204" pitchFamily="34" charset="0"/>
+              <a:buChar char="•"/>
+              <a:defRPr sz="1800" kern="1200">
+                <a:solidFill>
+                  <a:schemeClr val="tx1"/>
+                </a:solidFill>
+                <a:latin typeface="+mn-lt"/>
+                <a:ea typeface="+mn-ea"/>
+                <a:cs typeface="+mn-cs"/>
+              </a:defRPr>
+            </a:lvl8pPr>
+            <a:lvl9pPr marL="3886200" indent="-228600" algn="l" defTabSz="914400" rtl="0" eaLnBrk="1" latinLnBrk="0" hangingPunct="1">
+              <a:lnSpc>
+                <a:spcPct val="90000"/>
+              </a:lnSpc>
+              <a:spcBef>
+                <a:spcPts val="500"/>
+              </a:spcBef>
+              <a:buFont typeface="Arial" panose="020B0604020202020204" pitchFamily="34" charset="0"/>
+              <a:buChar char="•"/>
+              <a:defRPr sz="1800" kern="1200">
+                <a:solidFill>
+                  <a:schemeClr val="tx1"/>
+                </a:solidFill>
+                <a:latin typeface="+mn-lt"/>
+                <a:ea typeface="+mn-ea"/>
+                <a:cs typeface="+mn-cs"/>
+              </a:defRPr>
+            </a:lvl9pPr>
+          </a:lstStyle>
+          <a:p>
+            <a:r>
+              <a:rPr lang="de-DE"/>
+              <a:t>Augmentierung: Spiegeln, Crop with padding n = 4</a:t>
+            </a:r>
+            <a:endParaRPr lang="de-DE" dirty="0"/>
+          </a:p>
+        </p:txBody>
+      </p:sp>
+    </p:spTree>
+    <p:extLst>
+      <p:ext uri="{BB962C8B-B14F-4D97-AF65-F5344CB8AC3E}">
+        <p14:creationId xmlns:p14="http://schemas.microsoft.com/office/powerpoint/2010/main" val="1284608344"/>
+      </p:ext>
+    </p:extLst>
+  </p:cSld>
+  <p:clrMapOvr>
+    <a:masterClrMapping/>
+  </p:clrMapOvr>
+</p:sld>
+</file>
+
+<file path=ppt/slides/slide9.xml><?xml version="1.0" encoding="utf-8"?>
+<p:sld xmlns:a="http://schemas.openxmlformats.org/drawingml/2006/main" xmlns:r="http://schemas.openxmlformats.org/officeDocument/2006/relationships" xmlns:p="http://schemas.openxmlformats.org/presentationml/2006/main">
+  <p:cSld>
+    <p:spTree>
+      <p:nvGrpSpPr>
+        <p:cNvPr id="1" name=""/>
+        <p:cNvGrpSpPr/>
+        <p:nvPr/>
+      </p:nvGrpSpPr>
+      <p:grpSpPr>
+        <a:xfrm>
+          <a:off x="0" y="0"/>
+          <a:ext cx="0" cy="0"/>
+          <a:chOff x="0" y="0"/>
+          <a:chExt cx="0" cy="0"/>
+        </a:xfrm>
+      </p:grpSpPr>
+      <p:sp>
+        <p:nvSpPr>
+          <p:cNvPr id="2" name="Titel 1">
+            <a:extLst>
+              <a:ext uri="{FF2B5EF4-FFF2-40B4-BE49-F238E27FC236}">
+                <a16:creationId xmlns:a16="http://schemas.microsoft.com/office/drawing/2014/main" id="{9EE6259C-8E17-43C1-815C-EC58FCDFCE07}"/>
+              </a:ext>
+            </a:extLst>
+          </p:cNvPr>
+          <p:cNvSpPr>
+            <a:spLocks noGrp="1"/>
+          </p:cNvSpPr>
+          <p:nvPr>
+            <p:ph type="title"/>
+          </p:nvPr>
+        </p:nvSpPr>
+        <p:spPr/>
+        <p:txBody>
+          <a:bodyPr/>
+          <a:lstStyle/>
+          <a:p>
+            <a:r>
+              <a:rPr lang="de-DE" dirty="0"/>
+              <a:t>ResNet50 (no.1) – </a:t>
+            </a:r>
+            <a:r>
+              <a:rPr lang="de-DE" dirty="0" err="1"/>
+              <a:t>Confusion</a:t>
+            </a:r>
+            <a:r>
+              <a:rPr lang="de-DE" dirty="0"/>
+              <a:t> Matrix</a:t>
+            </a:r>
+          </a:p>
+        </p:txBody>
+      </p:sp>
+      <p:pic>
+        <p:nvPicPr>
+          <p:cNvPr id="6" name="Grafik 5">
+            <a:extLst>
+              <a:ext uri="{FF2B5EF4-FFF2-40B4-BE49-F238E27FC236}">
+                <a16:creationId xmlns:a16="http://schemas.microsoft.com/office/drawing/2014/main" id="{14932DAF-0E81-4E95-8560-F9C199BFDDCF}"/>
+              </a:ext>
+            </a:extLst>
+          </p:cNvPr>
+          <p:cNvPicPr>
+            <a:picLocks noChangeAspect="1"/>
+          </p:cNvPicPr>
+          <p:nvPr/>
+        </p:nvPicPr>
+        <p:blipFill>
+          <a:blip r:embed="rId2"/>
+          <a:stretch>
+            <a:fillRect/>
+          </a:stretch>
+        </p:blipFill>
+        <p:spPr>
+          <a:xfrm>
+            <a:off x="1542191" y="1567542"/>
+            <a:ext cx="9107618" cy="4749481"/>
+          </a:xfrm>
+          <a:prstGeom prst="rect">
+            <a:avLst/>
+          </a:prstGeom>
+        </p:spPr>
+      </p:pic>
+    </p:spTree>
+    <p:extLst>
+      <p:ext uri="{BB962C8B-B14F-4D97-AF65-F5344CB8AC3E}">
+        <p14:creationId xmlns:p14="http://schemas.microsoft.com/office/powerpoint/2010/main" val="3553548198"/>
       </p:ext>
     </p:extLst>
   </p:cSld>

</xml_diff>